<commit_message>
changed demo picture on presentation https://github.com/CymbidiumOrchid/NakMan/issues/3
</commit_message>
<xml_diff>
--- a/Cymbidium orchid.pptx
+++ b/Cymbidium orchid.pptx
@@ -228,7 +228,7 @@
             <a:fld id="{FE5B4EDC-59C0-49C7-8ADA-5A781B329E02}" type="datetimeFigureOut">
               <a:rPr lang="en-US"/>
               <a:pPr/>
-              <a:t>30-Jul-14</a:t>
+              <a:t>31-Jul-14</a:t>
             </a:fld>
             <a:endParaRPr dirty="0"/>
           </a:p>
@@ -427,7 +427,7 @@
             <a:fld id="{F2D8D46A-B586-417D-BFBD-8C8FE0AAF762}" type="datetimeFigureOut">
               <a:rPr lang="en-US" smtClean="0"/>
               <a:pPr/>
-              <a:t>30-Jul-14</a:t>
+              <a:t>31-Jul-14</a:t>
             </a:fld>
             <a:endParaRPr lang="en-US"/>
           </a:p>
@@ -1736,7 +1736,7 @@
             <a:fld id="{055373AC-9AA7-423B-BA00-BA1C74164DBD}" type="datetime1">
               <a:rPr lang="en-US" smtClean="0"/>
               <a:pPr/>
-              <a:t>30-Jul-14</a:t>
+              <a:t>31-Jul-14</a:t>
             </a:fld>
             <a:endParaRPr lang="en-US" dirty="0"/>
           </a:p>
@@ -2364,7 +2364,7 @@
             <a:fld id="{055373AC-9AA7-423B-BA00-BA1C74164DBD}" type="datetime1">
               <a:rPr lang="en-US" smtClean="0"/>
               <a:pPr/>
-              <a:t>30-Jul-14</a:t>
+              <a:t>31-Jul-14</a:t>
             </a:fld>
             <a:endParaRPr lang="en-US" dirty="0"/>
           </a:p>
@@ -4076,9 +4076,139 @@
           <a:noFill/>
         </p:spPr>
       </p:pic>
+      <p:sp>
+        <p:nvSpPr>
+          <p:cNvPr id="5" name="Правоъгълник 4"/>
+          <p:cNvSpPr/>
+          <p:nvPr/>
+        </p:nvSpPr>
+        <p:spPr>
+          <a:xfrm rot="20609458">
+            <a:off x="9254011" y="4139942"/>
+            <a:ext cx="2456122" cy="923330"/>
+          </a:xfrm>
+          <a:prstGeom prst="rect">
+            <a:avLst/>
+          </a:prstGeom>
+          <a:noFill/>
+        </p:spPr>
+        <p:txBody>
+          <a:bodyPr wrap="none" lIns="91440" tIns="45720" rIns="91440" bIns="45720">
+            <a:spAutoFit/>
+          </a:bodyPr>
+          <a:lstStyle/>
+          <a:p>
+            <a:pPr algn="ctr"/>
+            <a:r>
+              <a:rPr lang="en-US" sz="5400" b="1" cap="none" spc="0" dirty="0" smtClean="0">
+                <a:ln w="9525">
+                  <a:solidFill>
+                    <a:schemeClr val="bg1"/>
+                  </a:solidFill>
+                  <a:prstDash val="solid"/>
+                </a:ln>
+                <a:solidFill>
+                  <a:schemeClr val="tx1"/>
+                </a:solidFill>
+                <a:effectLst>
+                  <a:outerShdw blurRad="12700" dist="38100" dir="2700000" algn="tl" rotWithShape="0">
+                    <a:schemeClr val="bg1">
+                      <a:lumMod val="50000"/>
+                    </a:schemeClr>
+                  </a:outerShdw>
+                </a:effectLst>
+              </a:rPr>
+              <a:t>Demo…</a:t>
+            </a:r>
+            <a:endParaRPr lang="bg-BG" sz="5400" b="1" cap="none" spc="0" dirty="0">
+              <a:ln w="9525">
+                <a:solidFill>
+                  <a:schemeClr val="bg1"/>
+                </a:solidFill>
+                <a:prstDash val="solid"/>
+              </a:ln>
+              <a:solidFill>
+                <a:schemeClr val="tx1"/>
+              </a:solidFill>
+              <a:effectLst>
+                <a:outerShdw blurRad="12700" dist="38100" dir="2700000" algn="tl" rotWithShape="0">
+                  <a:schemeClr val="bg1">
+                    <a:lumMod val="50000"/>
+                  </a:schemeClr>
+                </a:outerShdw>
+              </a:effectLst>
+            </a:endParaRPr>
+          </a:p>
+        </p:txBody>
+      </p:sp>
+      <p:sp>
+        <p:nvSpPr>
+          <p:cNvPr id="16" name="Правоъгълник 15"/>
+          <p:cNvSpPr/>
+          <p:nvPr/>
+        </p:nvSpPr>
+        <p:spPr>
+          <a:xfrm rot="1134503">
+            <a:off x="136179" y="4096836"/>
+            <a:ext cx="2456122" cy="923330"/>
+          </a:xfrm>
+          <a:prstGeom prst="rect">
+            <a:avLst/>
+          </a:prstGeom>
+          <a:noFill/>
+        </p:spPr>
+        <p:txBody>
+          <a:bodyPr wrap="none" lIns="91440" tIns="45720" rIns="91440" bIns="45720">
+            <a:spAutoFit/>
+          </a:bodyPr>
+          <a:lstStyle/>
+          <a:p>
+            <a:pPr algn="ctr"/>
+            <a:r>
+              <a:rPr lang="en-US" sz="5400" b="1" cap="none" spc="0" dirty="0" smtClean="0">
+                <a:ln w="9525">
+                  <a:solidFill>
+                    <a:schemeClr val="bg1"/>
+                  </a:solidFill>
+                  <a:prstDash val="solid"/>
+                </a:ln>
+                <a:solidFill>
+                  <a:schemeClr val="tx1"/>
+                </a:solidFill>
+                <a:effectLst>
+                  <a:outerShdw blurRad="12700" dist="38100" dir="2700000" algn="tl" rotWithShape="0">
+                    <a:schemeClr val="bg1">
+                      <a:lumMod val="50000"/>
+                    </a:schemeClr>
+                  </a:outerShdw>
+                </a:effectLst>
+              </a:rPr>
+              <a:t>Demo…</a:t>
+            </a:r>
+            <a:endParaRPr lang="bg-BG" sz="5400" b="1" cap="none" spc="0" dirty="0">
+              <a:ln w="9525">
+                <a:solidFill>
+                  <a:schemeClr val="bg1"/>
+                </a:solidFill>
+                <a:prstDash val="solid"/>
+              </a:ln>
+              <a:solidFill>
+                <a:schemeClr val="tx1"/>
+              </a:solidFill>
+              <a:effectLst>
+                <a:outerShdw blurRad="12700" dist="38100" dir="2700000" algn="tl" rotWithShape="0">
+                  <a:schemeClr val="bg1">
+                    <a:lumMod val="50000"/>
+                  </a:schemeClr>
+                </a:outerShdw>
+              </a:effectLst>
+            </a:endParaRPr>
+          </a:p>
+        </p:txBody>
+      </p:sp>
       <p:pic>
         <p:nvPicPr>
-          <p:cNvPr id="4" name="Картина 3"/>
+          <p:cNvPr id="3" name="Картина 2"/>
           <p:cNvPicPr>
             <a:picLocks noChangeAspect="1"/>
           </p:cNvPicPr>
@@ -4098,144 +4228,14 @@
         </p:blipFill>
         <p:spPr>
           <a:xfrm>
-            <a:off x="2341070" y="1011869"/>
-            <a:ext cx="7049484" cy="4613457"/>
+            <a:off x="2633196" y="1008993"/>
+            <a:ext cx="6582694" cy="4706007"/>
           </a:xfrm>
           <a:prstGeom prst="rect">
             <a:avLst/>
           </a:prstGeom>
         </p:spPr>
       </p:pic>
-      <p:sp>
-        <p:nvSpPr>
-          <p:cNvPr id="5" name="Правоъгълник 4"/>
-          <p:cNvSpPr/>
-          <p:nvPr/>
-        </p:nvSpPr>
-        <p:spPr>
-          <a:xfrm rot="20609458">
-            <a:off x="8971193" y="4139942"/>
-            <a:ext cx="2456122" cy="923330"/>
-          </a:xfrm>
-          <a:prstGeom prst="rect">
-            <a:avLst/>
-          </a:prstGeom>
-          <a:noFill/>
-        </p:spPr>
-        <p:txBody>
-          <a:bodyPr wrap="none" lIns="91440" tIns="45720" rIns="91440" bIns="45720">
-            <a:spAutoFit/>
-          </a:bodyPr>
-          <a:lstStyle/>
-          <a:p>
-            <a:pPr algn="ctr"/>
-            <a:r>
-              <a:rPr lang="en-US" sz="5400" b="1" cap="none" spc="0" dirty="0" smtClean="0">
-                <a:ln w="9525">
-                  <a:solidFill>
-                    <a:schemeClr val="bg1"/>
-                  </a:solidFill>
-                  <a:prstDash val="solid"/>
-                </a:ln>
-                <a:solidFill>
-                  <a:schemeClr val="tx1"/>
-                </a:solidFill>
-                <a:effectLst>
-                  <a:outerShdw blurRad="12700" dist="38100" dir="2700000" algn="tl" rotWithShape="0">
-                    <a:schemeClr val="bg1">
-                      <a:lumMod val="50000"/>
-                    </a:schemeClr>
-                  </a:outerShdw>
-                </a:effectLst>
-              </a:rPr>
-              <a:t>Demo…</a:t>
-            </a:r>
-            <a:endParaRPr lang="bg-BG" sz="5400" b="1" cap="none" spc="0" dirty="0">
-              <a:ln w="9525">
-                <a:solidFill>
-                  <a:schemeClr val="bg1"/>
-                </a:solidFill>
-                <a:prstDash val="solid"/>
-              </a:ln>
-              <a:solidFill>
-                <a:schemeClr val="tx1"/>
-              </a:solidFill>
-              <a:effectLst>
-                <a:outerShdw blurRad="12700" dist="38100" dir="2700000" algn="tl" rotWithShape="0">
-                  <a:schemeClr val="bg1">
-                    <a:lumMod val="50000"/>
-                  </a:schemeClr>
-                </a:outerShdw>
-              </a:effectLst>
-            </a:endParaRPr>
-          </a:p>
-        </p:txBody>
-      </p:sp>
-      <p:sp>
-        <p:nvSpPr>
-          <p:cNvPr id="16" name="Правоъгълник 15"/>
-          <p:cNvSpPr/>
-          <p:nvPr/>
-        </p:nvSpPr>
-        <p:spPr>
-          <a:xfrm rot="1134503">
-            <a:off x="136179" y="4096836"/>
-            <a:ext cx="2456122" cy="923330"/>
-          </a:xfrm>
-          <a:prstGeom prst="rect">
-            <a:avLst/>
-          </a:prstGeom>
-          <a:noFill/>
-        </p:spPr>
-        <p:txBody>
-          <a:bodyPr wrap="none" lIns="91440" tIns="45720" rIns="91440" bIns="45720">
-            <a:spAutoFit/>
-          </a:bodyPr>
-          <a:lstStyle/>
-          <a:p>
-            <a:pPr algn="ctr"/>
-            <a:r>
-              <a:rPr lang="en-US" sz="5400" b="1" cap="none" spc="0" dirty="0" smtClean="0">
-                <a:ln w="9525">
-                  <a:solidFill>
-                    <a:schemeClr val="bg1"/>
-                  </a:solidFill>
-                  <a:prstDash val="solid"/>
-                </a:ln>
-                <a:solidFill>
-                  <a:schemeClr val="tx1"/>
-                </a:solidFill>
-                <a:effectLst>
-                  <a:outerShdw blurRad="12700" dist="38100" dir="2700000" algn="tl" rotWithShape="0">
-                    <a:schemeClr val="bg1">
-                      <a:lumMod val="50000"/>
-                    </a:schemeClr>
-                  </a:outerShdw>
-                </a:effectLst>
-              </a:rPr>
-              <a:t>Demo…</a:t>
-            </a:r>
-            <a:endParaRPr lang="bg-BG" sz="5400" b="1" cap="none" spc="0" dirty="0">
-              <a:ln w="9525">
-                <a:solidFill>
-                  <a:schemeClr val="bg1"/>
-                </a:solidFill>
-                <a:prstDash val="solid"/>
-              </a:ln>
-              <a:solidFill>
-                <a:schemeClr val="tx1"/>
-              </a:solidFill>
-              <a:effectLst>
-                <a:outerShdw blurRad="12700" dist="38100" dir="2700000" algn="tl" rotWithShape="0">
-                  <a:schemeClr val="bg1">
-                    <a:lumMod val="50000"/>
-                  </a:schemeClr>
-                </a:outerShdw>
-              </a:effectLst>
-            </a:endParaRPr>
-          </a:p>
-        </p:txBody>
-      </p:sp>
     </p:spTree>
     <p:extLst>
       <p:ext uri="{BB962C8B-B14F-4D97-AF65-F5344CB8AC3E}">

</xml_diff>